<commit_message>
added final video and presentation
</commit_message>
<xml_diff>
--- a/Docs/Final Presentation.pptx
+++ b/Docs/Final Presentation.pptx
@@ -115,6 +115,11 @@
       </a:defRPr>
     </a:lvl9pPr>
   </p:defaultTextStyle>
+  <p:extLst>
+    <p:ext uri="{EFAFB233-063F-42B5-8137-9DF3F51BA10A}">
+      <p15:sldGuideLst xmlns:p15="http://schemas.microsoft.com/office/powerpoint/2012/main"/>
+    </p:ext>
+  </p:extLst>
 </p:presentation>
 </file>
 
@@ -342,7 +347,7 @@
           <a:p>
             <a:fld id="{1FB4488D-424D-49BD-B917-570ECD046536}" type="datetimeFigureOut">
               <a:rPr lang="en-IE" smtClean="0"/>
-              <a:t>01/05/2021</a:t>
+              <a:t>04/05/2021</a:t>
             </a:fld>
             <a:endParaRPr lang="en-IE" dirty="0"/>
           </a:p>
@@ -512,7 +517,7 @@
           <a:p>
             <a:fld id="{1FB4488D-424D-49BD-B917-570ECD046536}" type="datetimeFigureOut">
               <a:rPr lang="en-IE" smtClean="0"/>
-              <a:t>01/05/2021</a:t>
+              <a:t>04/05/2021</a:t>
             </a:fld>
             <a:endParaRPr lang="en-IE" dirty="0"/>
           </a:p>
@@ -692,7 +697,7 @@
           <a:p>
             <a:fld id="{1FB4488D-424D-49BD-B917-570ECD046536}" type="datetimeFigureOut">
               <a:rPr lang="en-IE" smtClean="0"/>
-              <a:t>01/05/2021</a:t>
+              <a:t>04/05/2021</a:t>
             </a:fld>
             <a:endParaRPr lang="en-IE" dirty="0"/>
           </a:p>
@@ -862,7 +867,7 @@
           <a:p>
             <a:fld id="{1FB4488D-424D-49BD-B917-570ECD046536}" type="datetimeFigureOut">
               <a:rPr lang="en-IE" smtClean="0"/>
-              <a:t>01/05/2021</a:t>
+              <a:t>04/05/2021</a:t>
             </a:fld>
             <a:endParaRPr lang="en-IE" dirty="0"/>
           </a:p>
@@ -1116,7 +1121,7 @@
           <a:p>
             <a:fld id="{1FB4488D-424D-49BD-B917-570ECD046536}" type="datetimeFigureOut">
               <a:rPr lang="en-IE" smtClean="0"/>
-              <a:t>01/05/2021</a:t>
+              <a:t>04/05/2021</a:t>
             </a:fld>
             <a:endParaRPr lang="en-IE" dirty="0"/>
           </a:p>
@@ -1404,7 +1409,7 @@
           <a:p>
             <a:fld id="{1FB4488D-424D-49BD-B917-570ECD046536}" type="datetimeFigureOut">
               <a:rPr lang="en-IE" smtClean="0"/>
-              <a:t>01/05/2021</a:t>
+              <a:t>04/05/2021</a:t>
             </a:fld>
             <a:endParaRPr lang="en-IE" dirty="0"/>
           </a:p>
@@ -1846,7 +1851,7 @@
           <a:p>
             <a:fld id="{1FB4488D-424D-49BD-B917-570ECD046536}" type="datetimeFigureOut">
               <a:rPr lang="en-IE" smtClean="0"/>
-              <a:t>01/05/2021</a:t>
+              <a:t>04/05/2021</a:t>
             </a:fld>
             <a:endParaRPr lang="en-IE" dirty="0"/>
           </a:p>
@@ -1964,7 +1969,7 @@
           <a:p>
             <a:fld id="{1FB4488D-424D-49BD-B917-570ECD046536}" type="datetimeFigureOut">
               <a:rPr lang="en-IE" smtClean="0"/>
-              <a:t>01/05/2021</a:t>
+              <a:t>04/05/2021</a:t>
             </a:fld>
             <a:endParaRPr lang="en-IE" dirty="0"/>
           </a:p>
@@ -2059,7 +2064,7 @@
           <a:p>
             <a:fld id="{1FB4488D-424D-49BD-B917-570ECD046536}" type="datetimeFigureOut">
               <a:rPr lang="en-IE" smtClean="0"/>
-              <a:t>01/05/2021</a:t>
+              <a:t>04/05/2021</a:t>
             </a:fld>
             <a:endParaRPr lang="en-IE" dirty="0"/>
           </a:p>
@@ -2347,7 +2352,7 @@
           <a:p>
             <a:fld id="{1FB4488D-424D-49BD-B917-570ECD046536}" type="datetimeFigureOut">
               <a:rPr lang="en-IE" smtClean="0"/>
-              <a:t>01/05/2021</a:t>
+              <a:t>04/05/2021</a:t>
             </a:fld>
             <a:endParaRPr lang="en-IE" dirty="0"/>
           </a:p>
@@ -2619,7 +2624,7 @@
           <a:p>
             <a:fld id="{1FB4488D-424D-49BD-B917-570ECD046536}" type="datetimeFigureOut">
               <a:rPr lang="en-IE" smtClean="0"/>
-              <a:t>01/05/2021</a:t>
+              <a:t>04/05/2021</a:t>
             </a:fld>
             <a:endParaRPr lang="en-IE" dirty="0"/>
           </a:p>
@@ -2916,7 +2921,7 @@
           <a:p>
             <a:fld id="{1FB4488D-424D-49BD-B917-570ECD046536}" type="datetimeFigureOut">
               <a:rPr lang="en-IE" smtClean="0"/>
-              <a:t>01/05/2021</a:t>
+              <a:t>04/05/2021</a:t>
             </a:fld>
             <a:endParaRPr lang="en-IE" dirty="0"/>
           </a:p>
@@ -4255,14 +4260,14 @@
             <a:pPr lvl="1"/>
             <a:r>
               <a:rPr lang="en-GB" dirty="0"/>
-              <a:t>The main demo will be programmed in C++ using the SFML library for any visuals. </a:t>
+              <a:t>The main demo is programmed in C++ using the SFML library for any visuals. </a:t>
             </a:r>
           </a:p>
           <a:p>
             <a:pPr lvl="1"/>
             <a:r>
               <a:rPr lang="en-GB" dirty="0"/>
-              <a:t>All neural networks will be run in the C++ program</a:t>
+              <a:t>All neural networks are run in the C++ program</a:t>
             </a:r>
           </a:p>
           <a:p>
@@ -4275,7 +4280,7 @@
             <a:pPr lvl="1"/>
             <a:r>
               <a:rPr lang="en-GB" dirty="0"/>
-              <a:t>All reinforcement learning are programmed in the same C++ project from scratch using no external libraries.</a:t>
+              <a:t>All reinforcement learning is programmed in the same C++ project from scratch using no external libraries.</a:t>
             </a:r>
           </a:p>
           <a:p>

</xml_diff>